<commit_message>
Qucikfix and presentation updates.
</commit_message>
<xml_diff>
--- a/dokumentacija/prezentacija.pptx
+++ b/dokumentacija/prezentacija.pptx
@@ -4098,10 +4098,10 @@
         <a:gradFill rotWithShape="0">
           <a:gsLst>
             <a:gs pos="0">
-              <a:srgbClr val="ffffb9"/>
+              <a:srgbClr val="b2b2b2"/>
             </a:gs>
             <a:gs pos="100000">
-              <a:srgbClr val="ffc0d1"/>
+              <a:srgbClr val="dddddd"/>
             </a:gs>
           </a:gsLst>
           <a:lin ang="3600000"/>
@@ -4366,10 +4366,10 @@
         <a:gradFill rotWithShape="0">
           <a:gsLst>
             <a:gs pos="0">
-              <a:srgbClr val="ffffb9"/>
+              <a:srgbClr val="999999"/>
             </a:gs>
             <a:gs pos="100000">
-              <a:srgbClr val="ffc0d1"/>
+              <a:srgbClr val="cccccc"/>
             </a:gs>
           </a:gsLst>
           <a:lin ang="3600000"/>
@@ -4633,10 +4633,10 @@
         <a:gradFill rotWithShape="0">
           <a:gsLst>
             <a:gs pos="0">
-              <a:srgbClr val="ffffb9"/>
+              <a:srgbClr val="cccccc"/>
             </a:gs>
             <a:gs pos="100000">
-              <a:srgbClr val="ffc0d1"/>
+              <a:srgbClr val="dddddd"/>
             </a:gs>
           </a:gsLst>
           <a:lin ang="3600000"/>
@@ -4919,7 +4919,7 @@
         <p:spPr>
           <a:xfrm>
             <a:off x="504000" y="226080"/>
-            <a:ext cx="9070560" cy="4387320"/>
+            <a:ext cx="9069840" cy="4386600"/>
           </a:xfrm>
           <a:prstGeom prst="rect">
             <a:avLst/>
@@ -5040,7 +5040,7 @@
         <p:spPr>
           <a:xfrm>
             <a:off x="504000" y="226080"/>
-            <a:ext cx="9070560" cy="945360"/>
+            <a:ext cx="9069840" cy="459720"/>
           </a:xfrm>
           <a:prstGeom prst="rect">
             <a:avLst/>
@@ -5067,7 +5067,7 @@
               </a:lnSpc>
             </a:pPr>
             <a:r>
-              <a:rPr b="0" lang="en-US" sz="4400" spc="-1" strike="noStrike">
+              <a:rPr b="0" lang="en-US" sz="3200" spc="-1" strike="noStrike">
                 <a:solidFill>
                   <a:srgbClr val="3d0c33"/>
                 </a:solidFill>
@@ -5076,7 +5076,7 @@
               </a:rPr>
               <a:t>Uzdevuma nostādne</a:t>
             </a:r>
-            <a:endParaRPr b="0" lang="en-US" sz="4400" spc="-1" strike="noStrike">
+            <a:endParaRPr b="0" lang="en-US" sz="3200" spc="-1" strike="noStrike">
               <a:latin typeface="Arial"/>
             </a:endParaRPr>
           </a:p>
@@ -5091,7 +5091,7 @@
         <p:spPr>
           <a:xfrm>
             <a:off x="504000" y="1326600"/>
-            <a:ext cx="9070560" cy="3287160"/>
+            <a:ext cx="9069840" cy="3286440"/>
           </a:xfrm>
           <a:prstGeom prst="rect">
             <a:avLst/>
@@ -5112,7 +5112,7 @@
             <a:normAutofit/>
           </a:bodyPr>
           <a:p>
-            <a:pPr marL="432000" indent="-322920">
+            <a:pPr marL="432000" indent="-322200">
               <a:lnSpc>
                 <a:spcPct val="100000"/>
               </a:lnSpc>
@@ -5127,7 +5127,7 @@
               <a:buChar char=""/>
             </a:pPr>
             <a:r>
-              <a:rPr b="0" lang="en-US" sz="3200" spc="-1" strike="noStrike">
+              <a:rPr b="0" lang="en-US" sz="2400" spc="-1" strike="noStrike">
                 <a:solidFill>
                   <a:srgbClr val="3d0c33"/>
                 </a:solidFill>
@@ -5136,12 +5136,12 @@
               </a:rPr>
               <a:t>Izveidot interneta veikala sistēmu</a:t>
             </a:r>
-            <a:endParaRPr b="0" lang="en-US" sz="3200" spc="-1" strike="noStrike">
-              <a:latin typeface="Arial"/>
-            </a:endParaRPr>
-          </a:p>
-          <a:p>
-            <a:pPr marL="432000" indent="-322920">
+            <a:endParaRPr b="0" lang="en-US" sz="2400" spc="-1" strike="noStrike">
+              <a:latin typeface="Arial"/>
+            </a:endParaRPr>
+          </a:p>
+          <a:p>
+            <a:pPr marL="432000" indent="-322200">
               <a:lnSpc>
                 <a:spcPct val="100000"/>
               </a:lnSpc>
@@ -5156,7 +5156,7 @@
               <a:buChar char=""/>
             </a:pPr>
             <a:r>
-              <a:rPr b="0" lang="en-US" sz="3200" spc="-1" strike="noStrike">
+              <a:rPr b="0" lang="en-US" sz="2400" spc="-1" strike="noStrike">
                 <a:solidFill>
                   <a:srgbClr val="3d0c33"/>
                 </a:solidFill>
@@ -5165,12 +5165,12 @@
               </a:rPr>
               <a:t>Viesis</a:t>
             </a:r>
-            <a:endParaRPr b="0" lang="en-US" sz="3200" spc="-1" strike="noStrike">
-              <a:latin typeface="Arial"/>
-            </a:endParaRPr>
-          </a:p>
-          <a:p>
-            <a:pPr marL="432000" indent="-322920">
+            <a:endParaRPr b="0" lang="en-US" sz="2400" spc="-1" strike="noStrike">
+              <a:latin typeface="Arial"/>
+            </a:endParaRPr>
+          </a:p>
+          <a:p>
+            <a:pPr marL="432000" indent="-322200">
               <a:lnSpc>
                 <a:spcPct val="100000"/>
               </a:lnSpc>
@@ -5185,7 +5185,7 @@
               <a:buChar char=""/>
             </a:pPr>
             <a:r>
-              <a:rPr b="0" lang="en-US" sz="3200" spc="-1" strike="noStrike">
+              <a:rPr b="0" lang="en-US" sz="2400" spc="-1" strike="noStrike">
                 <a:solidFill>
                   <a:srgbClr val="3d0c33"/>
                 </a:solidFill>
@@ -5194,12 +5194,12 @@
               </a:rPr>
               <a:t>Administrātors</a:t>
             </a:r>
-            <a:endParaRPr b="0" lang="en-US" sz="3200" spc="-1" strike="noStrike">
-              <a:latin typeface="Arial"/>
-            </a:endParaRPr>
-          </a:p>
-          <a:p>
-            <a:pPr marL="432000" indent="-322920">
+            <a:endParaRPr b="0" lang="en-US" sz="2400" spc="-1" strike="noStrike">
+              <a:latin typeface="Arial"/>
+            </a:endParaRPr>
+          </a:p>
+          <a:p>
+            <a:pPr marL="432000" indent="-322200">
               <a:lnSpc>
                 <a:spcPct val="100000"/>
               </a:lnSpc>
@@ -5214,7 +5214,7 @@
               <a:buChar char=""/>
             </a:pPr>
             <a:r>
-              <a:rPr b="0" lang="en-US" sz="3200" spc="-1" strike="noStrike">
+              <a:rPr b="0" lang="en-US" sz="2400" spc="-1" strike="noStrike">
                 <a:solidFill>
                   <a:srgbClr val="3d0c33"/>
                 </a:solidFill>
@@ -5223,7 +5223,7 @@
               </a:rPr>
               <a:t>Klients</a:t>
             </a:r>
-            <a:endParaRPr b="0" lang="en-US" sz="3200" spc="-1" strike="noStrike">
+            <a:endParaRPr b="0" lang="en-US" sz="2400" spc="-1" strike="noStrike">
               <a:latin typeface="Arial"/>
             </a:endParaRPr>
           </a:p>
@@ -5268,7 +5268,7 @@
         <p:spPr>
           <a:xfrm>
             <a:off x="504000" y="226080"/>
-            <a:ext cx="9070560" cy="945360"/>
+            <a:ext cx="9069840" cy="459720"/>
           </a:xfrm>
           <a:prstGeom prst="rect">
             <a:avLst/>
@@ -5295,7 +5295,7 @@
               </a:lnSpc>
             </a:pPr>
             <a:r>
-              <a:rPr b="0" lang="en-US" sz="4400" spc="-1" strike="noStrike">
+              <a:rPr b="0" lang="en-US" sz="2400" spc="-1" strike="noStrike">
                 <a:solidFill>
                   <a:srgbClr val="3d0c33"/>
                 </a:solidFill>
@@ -5304,7 +5304,7 @@
               </a:rPr>
               <a:t>Izmantotās izstrādes tehnoloģijas</a:t>
             </a:r>
-            <a:endParaRPr b="0" lang="en-US" sz="4400" spc="-1" strike="noStrike">
+            <a:endParaRPr b="0" lang="en-US" sz="2400" spc="-1" strike="noStrike">
               <a:latin typeface="Arial"/>
             </a:endParaRPr>
           </a:p>
@@ -5319,7 +5319,7 @@
         <p:spPr>
           <a:xfrm>
             <a:off x="504000" y="1326600"/>
-            <a:ext cx="9070560" cy="3287160"/>
+            <a:ext cx="9069840" cy="3286440"/>
           </a:xfrm>
           <a:prstGeom prst="rect">
             <a:avLst/>
@@ -5337,10 +5337,10 @@
         </p:style>
         <p:txBody>
           <a:bodyPr lIns="0" rIns="0" tIns="0" bIns="0">
-            <a:normAutofit fontScale="54000"/>
-          </a:bodyPr>
-          <a:p>
-            <a:pPr marL="432000" indent="-322920">
+            <a:normAutofit/>
+          </a:bodyPr>
+          <a:p>
+            <a:pPr marL="432000" indent="-322200">
               <a:lnSpc>
                 <a:spcPct val="100000"/>
               </a:lnSpc>
@@ -5355,7 +5355,7 @@
               <a:buChar char=""/>
             </a:pPr>
             <a:r>
-              <a:rPr b="0" lang="en-US" sz="3200" spc="-1" strike="noStrike">
+              <a:rPr b="0" lang="en-US" sz="2400" spc="-1" strike="noStrike">
                 <a:solidFill>
                   <a:srgbClr val="3d0c33"/>
                 </a:solidFill>
@@ -5364,12 +5364,12 @@
               </a:rPr>
               <a:t>JavaScript</a:t>
             </a:r>
-            <a:endParaRPr b="0" lang="en-US" sz="3200" spc="-1" strike="noStrike">
-              <a:latin typeface="Arial"/>
-            </a:endParaRPr>
-          </a:p>
-          <a:p>
-            <a:pPr marL="432000" indent="-322920">
+            <a:endParaRPr b="0" lang="en-US" sz="2400" spc="-1" strike="noStrike">
+              <a:latin typeface="Arial"/>
+            </a:endParaRPr>
+          </a:p>
+          <a:p>
+            <a:pPr marL="432000" indent="-322200">
               <a:lnSpc>
                 <a:spcPct val="100000"/>
               </a:lnSpc>
@@ -5384,7 +5384,7 @@
               <a:buChar char=""/>
             </a:pPr>
             <a:r>
-              <a:rPr b="0" lang="en-US" sz="3200" spc="-1" strike="noStrike">
+              <a:rPr b="0" lang="en-US" sz="2400" spc="-1" strike="noStrike">
                 <a:solidFill>
                   <a:srgbClr val="3d0c33"/>
                 </a:solidFill>
@@ -5393,12 +5393,12 @@
               </a:rPr>
               <a:t>React</a:t>
             </a:r>
-            <a:endParaRPr b="0" lang="en-US" sz="3200" spc="-1" strike="noStrike">
-              <a:latin typeface="Arial"/>
-            </a:endParaRPr>
-          </a:p>
-          <a:p>
-            <a:pPr marL="432000" indent="-322920">
+            <a:endParaRPr b="0" lang="en-US" sz="2400" spc="-1" strike="noStrike">
+              <a:latin typeface="Arial"/>
+            </a:endParaRPr>
+          </a:p>
+          <a:p>
+            <a:pPr marL="432000" indent="-322200">
               <a:lnSpc>
                 <a:spcPct val="100000"/>
               </a:lnSpc>
@@ -5413,21 +5413,21 @@
               <a:buChar char=""/>
             </a:pPr>
             <a:r>
-              <a:rPr b="0" lang="en-US" sz="3200" spc="-1" strike="noStrike">
+              <a:rPr b="0" lang="en-US" sz="2400" spc="-1" strike="noStrike">
                 <a:solidFill>
                   <a:srgbClr val="3d0c33"/>
                 </a:solidFill>
                 <a:latin typeface="Arial"/>
                 <a:ea typeface="DejaVu Sans"/>
               </a:rPr>
-              <a:t>Material UI</a:t>
+              <a:t>Material UI, React Admin</a:t>
             </a:r>
-            <a:endParaRPr b="0" lang="en-US" sz="3200" spc="-1" strike="noStrike">
-              <a:latin typeface="Arial"/>
-            </a:endParaRPr>
-          </a:p>
-          <a:p>
-            <a:pPr marL="432000" indent="-322920">
+            <a:endParaRPr b="0" lang="en-US" sz="2400" spc="-1" strike="noStrike">
+              <a:latin typeface="Arial"/>
+            </a:endParaRPr>
+          </a:p>
+          <a:p>
+            <a:pPr marL="432000" indent="-322200">
               <a:lnSpc>
                 <a:spcPct val="100000"/>
               </a:lnSpc>
@@ -5442,21 +5442,21 @@
               <a:buChar char=""/>
             </a:pPr>
             <a:r>
-              <a:rPr b="0" lang="en-US" sz="3200" spc="-1" strike="noStrike">
+              <a:rPr b="0" lang="en-US" sz="2400" spc="-1" strike="noStrike">
                 <a:solidFill>
                   <a:srgbClr val="3d0c33"/>
                 </a:solidFill>
                 <a:latin typeface="Arial"/>
                 <a:ea typeface="DejaVu Sans"/>
               </a:rPr>
-              <a:t>React Admin</a:t>
+              <a:t>Node, Express</a:t>
             </a:r>
-            <a:endParaRPr b="0" lang="en-US" sz="3200" spc="-1" strike="noStrike">
-              <a:latin typeface="Arial"/>
-            </a:endParaRPr>
-          </a:p>
-          <a:p>
-            <a:pPr marL="432000" indent="-322920">
+            <a:endParaRPr b="0" lang="en-US" sz="2400" spc="-1" strike="noStrike">
+              <a:latin typeface="Arial"/>
+            </a:endParaRPr>
+          </a:p>
+          <a:p>
+            <a:pPr marL="432000" indent="-322200">
               <a:lnSpc>
                 <a:spcPct val="100000"/>
               </a:lnSpc>
@@ -5471,21 +5471,21 @@
               <a:buChar char=""/>
             </a:pPr>
             <a:r>
-              <a:rPr b="0" lang="en-US" sz="3200" spc="-1" strike="noStrike">
+              <a:rPr b="0" lang="en-US" sz="2400" spc="-1" strike="noStrike">
                 <a:solidFill>
                   <a:srgbClr val="3d0c33"/>
                 </a:solidFill>
                 <a:latin typeface="Arial"/>
                 <a:ea typeface="DejaVu Sans"/>
               </a:rPr>
-              <a:t>Node</a:t>
+              <a:t>GraphQL</a:t>
             </a:r>
-            <a:endParaRPr b="0" lang="en-US" sz="3200" spc="-1" strike="noStrike">
-              <a:latin typeface="Arial"/>
-            </a:endParaRPr>
-          </a:p>
-          <a:p>
-            <a:pPr marL="432000" indent="-322920">
+            <a:endParaRPr b="0" lang="en-US" sz="2400" spc="-1" strike="noStrike">
+              <a:latin typeface="Arial"/>
+            </a:endParaRPr>
+          </a:p>
+          <a:p>
+            <a:pPr marL="432000" indent="-322200">
               <a:lnSpc>
                 <a:spcPct val="100000"/>
               </a:lnSpc>
@@ -5500,65 +5500,7 @@
               <a:buChar char=""/>
             </a:pPr>
             <a:r>
-              <a:rPr b="0" lang="en-US" sz="3200" spc="-1" strike="noStrike">
-                <a:solidFill>
-                  <a:srgbClr val="3d0c33"/>
-                </a:solidFill>
-                <a:latin typeface="Arial"/>
-                <a:ea typeface="DejaVu Sans"/>
-              </a:rPr>
-              <a:t>Express</a:t>
-            </a:r>
-            <a:endParaRPr b="0" lang="en-US" sz="3200" spc="-1" strike="noStrike">
-              <a:latin typeface="Arial"/>
-            </a:endParaRPr>
-          </a:p>
-          <a:p>
-            <a:pPr marL="432000" indent="-322920">
-              <a:lnSpc>
-                <a:spcPct val="100000"/>
-              </a:lnSpc>
-              <a:spcBef>
-                <a:spcPts val="1417"/>
-              </a:spcBef>
-              <a:buClr>
-                <a:srgbClr val="000000"/>
-              </a:buClr>
-              <a:buSzPct val="45000"/>
-              <a:buFont typeface="Wingdings" charset="2"/>
-              <a:buChar char=""/>
-            </a:pPr>
-            <a:r>
-              <a:rPr b="0" lang="en-US" sz="3200" spc="-1" strike="noStrike">
-                <a:solidFill>
-                  <a:srgbClr val="3d0c33"/>
-                </a:solidFill>
-                <a:latin typeface="Arial"/>
-                <a:ea typeface="DejaVu Sans"/>
-              </a:rPr>
-              <a:t>GraphQL</a:t>
-            </a:r>
-            <a:endParaRPr b="0" lang="en-US" sz="3200" spc="-1" strike="noStrike">
-              <a:latin typeface="Arial"/>
-            </a:endParaRPr>
-          </a:p>
-          <a:p>
-            <a:pPr marL="432000" indent="-322920">
-              <a:lnSpc>
-                <a:spcPct val="100000"/>
-              </a:lnSpc>
-              <a:spcBef>
-                <a:spcPts val="1417"/>
-              </a:spcBef>
-              <a:buClr>
-                <a:srgbClr val="000000"/>
-              </a:buClr>
-              <a:buSzPct val="45000"/>
-              <a:buFont typeface="Wingdings" charset="2"/>
-              <a:buChar char=""/>
-            </a:pPr>
-            <a:r>
-              <a:rPr b="0" lang="en-US" sz="3200" spc="-1" strike="noStrike">
+              <a:rPr b="0" lang="en-US" sz="2400" spc="-1" strike="noStrike">
                 <a:solidFill>
                   <a:srgbClr val="3d0c33"/>
                 </a:solidFill>
@@ -5567,7 +5509,7 @@
               </a:rPr>
               <a:t>PostgreSQL</a:t>
             </a:r>
-            <a:endParaRPr b="0" lang="en-US" sz="3200" spc="-1" strike="noStrike">
+            <a:endParaRPr b="0" lang="en-US" sz="2400" spc="-1" strike="noStrike">
               <a:latin typeface="Arial"/>
             </a:endParaRPr>
           </a:p>
@@ -5603,9 +5545,46 @@
           <a:chExt cx="0" cy="0"/>
         </a:xfrm>
       </p:grpSpPr>
+      <p:sp>
+        <p:nvSpPr>
+          <p:cNvPr id="119" name=""/>
+          <p:cNvSpPr txBox="1"/>
+          <p:nvPr/>
+        </p:nvSpPr>
+        <p:spPr>
+          <a:xfrm>
+            <a:off x="504000" y="226080"/>
+            <a:ext cx="9071640" cy="459720"/>
+          </a:xfrm>
+          <a:prstGeom prst="rect">
+            <a:avLst/>
+          </a:prstGeom>
+          <a:noFill/>
+          <a:ln w="0">
+            <a:noFill/>
+          </a:ln>
+        </p:spPr>
+        <p:txBody>
+          <a:bodyPr lIns="0" rIns="0" tIns="0" bIns="0" anchor="ctr">
+            <a:noAutofit/>
+          </a:bodyPr>
+          <a:p>
+            <a:pPr algn="ctr"/>
+            <a:r>
+              <a:rPr b="0" lang="en-US" sz="3200" spc="-1" strike="noStrike">
+                <a:latin typeface="Arial"/>
+              </a:rPr>
+              <a:t>Funkcionālās dekompozīcas diagramma</a:t>
+            </a:r>
+            <a:endParaRPr b="0" lang="en-US" sz="3200" spc="-1" strike="noStrike">
+              <a:latin typeface="Arial"/>
+            </a:endParaRPr>
+          </a:p>
+        </p:txBody>
+      </p:sp>
       <p:pic>
         <p:nvPicPr>
-          <p:cNvPr id="119" name="" descr=""/>
+          <p:cNvPr id="120" name="" descr=""/>
           <p:cNvPicPr/>
           <p:nvPr/>
         </p:nvPicPr>
@@ -5615,8 +5594,8 @@
         </p:blipFill>
         <p:spPr>
           <a:xfrm>
-            <a:off x="1216800" y="14760"/>
-            <a:ext cx="7690680" cy="5670000"/>
+            <a:off x="1674000" y="837360"/>
+            <a:ext cx="6555600" cy="4833360"/>
           </a:xfrm>
           <a:prstGeom prst="rect">
             <a:avLst/>
@@ -5658,7 +5637,7 @@
       </p:grpSpPr>
       <p:pic>
         <p:nvPicPr>
-          <p:cNvPr id="120" name="" descr=""/>
+          <p:cNvPr id="121" name="" descr=""/>
           <p:cNvPicPr/>
           <p:nvPr/>
         </p:nvPicPr>
@@ -5668,8 +5647,8 @@
         </p:blipFill>
         <p:spPr>
           <a:xfrm>
-            <a:off x="1622160" y="14760"/>
-            <a:ext cx="6879960" cy="5670360"/>
+            <a:off x="1371600" y="692640"/>
+            <a:ext cx="7315200" cy="4978080"/>
           </a:xfrm>
           <a:prstGeom prst="rect">
             <a:avLst/>
@@ -5679,6 +5658,43 @@
           </a:ln>
         </p:spPr>
       </p:pic>
+      <p:sp>
+        <p:nvSpPr>
+          <p:cNvPr id="122" name=""/>
+          <p:cNvSpPr txBox="1"/>
+          <p:nvPr/>
+        </p:nvSpPr>
+        <p:spPr>
+          <a:xfrm>
+            <a:off x="504000" y="226080"/>
+            <a:ext cx="9072000" cy="459720"/>
+          </a:xfrm>
+          <a:prstGeom prst="rect">
+            <a:avLst/>
+          </a:prstGeom>
+          <a:noFill/>
+          <a:ln w="0">
+            <a:noFill/>
+          </a:ln>
+        </p:spPr>
+        <p:txBody>
+          <a:bodyPr lIns="0" rIns="0" tIns="0" bIns="0" anchor="ctr">
+            <a:noAutofit/>
+          </a:bodyPr>
+          <a:p>
+            <a:pPr algn="ctr"/>
+            <a:r>
+              <a:rPr b="0" lang="en-US" sz="3200" spc="-1" strike="noStrike">
+                <a:latin typeface="Arial"/>
+              </a:rPr>
+              <a:t>ER diagramma</a:t>
+            </a:r>
+            <a:endParaRPr b="0" lang="en-US" sz="3200" spc="-1" strike="noStrike">
+              <a:latin typeface="Arial"/>
+            </a:endParaRPr>
+          </a:p>
+        </p:txBody>
+      </p:sp>
     </p:spTree>
   </p:cSld>
   <mc:AlternateContent>
@@ -5709,9 +5725,46 @@
           <a:chExt cx="0" cy="0"/>
         </a:xfrm>
       </p:grpSpPr>
+      <p:sp>
+        <p:nvSpPr>
+          <p:cNvPr id="123" name=""/>
+          <p:cNvSpPr txBox="1"/>
+          <p:nvPr/>
+        </p:nvSpPr>
+        <p:spPr>
+          <a:xfrm>
+            <a:off x="504000" y="226080"/>
+            <a:ext cx="9072000" cy="459720"/>
+          </a:xfrm>
+          <a:prstGeom prst="rect">
+            <a:avLst/>
+          </a:prstGeom>
+          <a:noFill/>
+          <a:ln w="0">
+            <a:noFill/>
+          </a:ln>
+        </p:spPr>
+        <p:txBody>
+          <a:bodyPr lIns="0" rIns="0" tIns="0" bIns="0" anchor="ctr">
+            <a:noAutofit/>
+          </a:bodyPr>
+          <a:p>
+            <a:pPr algn="ctr"/>
+            <a:r>
+              <a:rPr b="0" lang="en-US" sz="3200" spc="-1" strike="noStrike">
+                <a:latin typeface="Arial"/>
+              </a:rPr>
+              <a:t>Tabulu shēma</a:t>
+            </a:r>
+            <a:endParaRPr b="0" lang="en-US" sz="3200" spc="-1" strike="noStrike">
+              <a:latin typeface="Arial"/>
+            </a:endParaRPr>
+          </a:p>
+        </p:txBody>
+      </p:sp>
       <p:pic>
         <p:nvPicPr>
-          <p:cNvPr id="121" name="" descr=""/>
+          <p:cNvPr id="124" name="" descr=""/>
           <p:cNvPicPr/>
           <p:nvPr/>
         </p:nvPicPr>
@@ -5721,8 +5774,8 @@
         </p:blipFill>
         <p:spPr>
           <a:xfrm>
-            <a:off x="1415880" y="14760"/>
-            <a:ext cx="7292520" cy="5670000"/>
+            <a:off x="919080" y="841680"/>
+            <a:ext cx="8224920" cy="4829040"/>
           </a:xfrm>
           <a:prstGeom prst="rect">
             <a:avLst/>
@@ -5762,9 +5815,46 @@
           <a:chExt cx="0" cy="0"/>
         </a:xfrm>
       </p:grpSpPr>
+      <p:sp>
+        <p:nvSpPr>
+          <p:cNvPr id="125" name=""/>
+          <p:cNvSpPr txBox="1"/>
+          <p:nvPr/>
+        </p:nvSpPr>
+        <p:spPr>
+          <a:xfrm>
+            <a:off x="504000" y="226080"/>
+            <a:ext cx="9072000" cy="459720"/>
+          </a:xfrm>
+          <a:prstGeom prst="rect">
+            <a:avLst/>
+          </a:prstGeom>
+          <a:noFill/>
+          <a:ln w="0">
+            <a:noFill/>
+          </a:ln>
+        </p:spPr>
+        <p:txBody>
+          <a:bodyPr lIns="0" rIns="0" tIns="0" bIns="0" anchor="ctr">
+            <a:noAutofit/>
+          </a:bodyPr>
+          <a:p>
+            <a:pPr algn="ctr"/>
+            <a:r>
+              <a:rPr b="0" lang="en-US" sz="3200" spc="-1" strike="noStrike">
+                <a:latin typeface="Arial"/>
+              </a:rPr>
+              <a:t>Datu plūsmas diagramma (pasūtījuma izveide)</a:t>
+            </a:r>
+            <a:endParaRPr b="0" lang="en-US" sz="3200" spc="-1" strike="noStrike">
+              <a:latin typeface="Arial"/>
+            </a:endParaRPr>
+          </a:p>
+        </p:txBody>
+      </p:sp>
       <p:pic>
         <p:nvPicPr>
-          <p:cNvPr id="122" name="" descr=""/>
+          <p:cNvPr id="126" name="" descr=""/>
           <p:cNvPicPr/>
           <p:nvPr/>
         </p:nvPicPr>
@@ -5774,8 +5864,8 @@
         </p:blipFill>
         <p:spPr>
           <a:xfrm>
-            <a:off x="1180080" y="15120"/>
-            <a:ext cx="7763040" cy="5668560"/>
+            <a:off x="1956240" y="861120"/>
+            <a:ext cx="6044760" cy="4809600"/>
           </a:xfrm>
           <a:prstGeom prst="rect">
             <a:avLst/>
@@ -5817,14 +5907,14 @@
       </p:grpSpPr>
       <p:sp>
         <p:nvSpPr>
-          <p:cNvPr id="123" name=""/>
+          <p:cNvPr id="127" name=""/>
           <p:cNvSpPr/>
           <p:nvPr/>
         </p:nvSpPr>
         <p:spPr>
           <a:xfrm>
             <a:off x="504000" y="226080"/>
-            <a:ext cx="9071280" cy="945720"/>
+            <a:ext cx="9070560" cy="945000"/>
           </a:xfrm>
           <a:prstGeom prst="rect">
             <a:avLst/>
@@ -5871,14 +5961,14 @@
       </p:sp>
       <p:sp>
         <p:nvSpPr>
-          <p:cNvPr id="124" name=""/>
+          <p:cNvPr id="128" name=""/>
           <p:cNvSpPr/>
           <p:nvPr/>
         </p:nvSpPr>
         <p:spPr>
           <a:xfrm>
             <a:off x="504000" y="1326600"/>
-            <a:ext cx="9071280" cy="3287880"/>
+            <a:ext cx="9070560" cy="3287160"/>
           </a:xfrm>
           <a:prstGeom prst="rect">
             <a:avLst/>
@@ -5899,7 +5989,7 @@
             <a:normAutofit/>
           </a:bodyPr>
           <a:p>
-            <a:pPr marL="432000" indent="-323280">
+            <a:pPr marL="432000" indent="-322560">
               <a:lnSpc>
                 <a:spcPct val="100000"/>
               </a:lnSpc>
@@ -5922,6 +6012,64 @@
                 <a:ea typeface="DejaVu Sans"/>
               </a:rPr>
               <a:t>Demonstrācija</a:t>
+            </a:r>
+            <a:endParaRPr b="0" lang="en-US" sz="3200" spc="-1" strike="noStrike">
+              <a:latin typeface="Arial"/>
+            </a:endParaRPr>
+          </a:p>
+          <a:p>
+            <a:pPr marL="432000" indent="-322560">
+              <a:lnSpc>
+                <a:spcPct val="100000"/>
+              </a:lnSpc>
+              <a:spcBef>
+                <a:spcPts val="1414"/>
+              </a:spcBef>
+              <a:buClr>
+                <a:srgbClr val="000000"/>
+              </a:buClr>
+              <a:buSzPct val="45000"/>
+              <a:buFont typeface="Wingdings" charset="2"/>
+              <a:buChar char=""/>
+            </a:pPr>
+            <a:r>
+              <a:rPr b="0" lang="en-US" sz="3200" spc="-1" strike="noStrike">
+                <a:solidFill>
+                  <a:srgbClr val="3d0c33"/>
+                </a:solidFill>
+                <a:latin typeface="Arial"/>
+                <a:ea typeface="DejaVu Sans"/>
+              </a:rPr>
+              <a:t>Pircēja daļa</a:t>
+            </a:r>
+            <a:endParaRPr b="0" lang="en-US" sz="3200" spc="-1" strike="noStrike">
+              <a:latin typeface="Arial"/>
+            </a:endParaRPr>
+          </a:p>
+          <a:p>
+            <a:pPr marL="432000" indent="-322560">
+              <a:lnSpc>
+                <a:spcPct val="100000"/>
+              </a:lnSpc>
+              <a:spcBef>
+                <a:spcPts val="1414"/>
+              </a:spcBef>
+              <a:buClr>
+                <a:srgbClr val="000000"/>
+              </a:buClr>
+              <a:buSzPct val="45000"/>
+              <a:buFont typeface="Wingdings" charset="2"/>
+              <a:buChar char=""/>
+            </a:pPr>
+            <a:r>
+              <a:rPr b="0" lang="en-US" sz="3200" spc="-1" strike="noStrike">
+                <a:solidFill>
+                  <a:srgbClr val="3d0c33"/>
+                </a:solidFill>
+                <a:latin typeface="Arial"/>
+                <a:ea typeface="DejaVu Sans"/>
+              </a:rPr>
+              <a:t>Produkta izveide</a:t>
             </a:r>
             <a:endParaRPr b="0" lang="en-US" sz="3200" spc="-1" strike="noStrike">
               <a:latin typeface="Arial"/>
@@ -5961,14 +6109,14 @@
       </p:grpSpPr>
       <p:sp>
         <p:nvSpPr>
-          <p:cNvPr id="125" name=""/>
+          <p:cNvPr id="129" name=""/>
           <p:cNvSpPr/>
           <p:nvPr/>
         </p:nvSpPr>
         <p:spPr>
           <a:xfrm>
             <a:off x="504000" y="226080"/>
-            <a:ext cx="9070560" cy="4387320"/>
+            <a:ext cx="9069840" cy="4386600"/>
           </a:xfrm>
           <a:prstGeom prst="rect">
             <a:avLst/>

</xml_diff>